<commit_message>
Added help screen to neighbors.html, and changed color of CHA in eras.html to make it a lighter turqouise
</commit_message>
<xml_diff>
--- a/nikhil/neighbors/neighborsHelp.pptx
+++ b/nikhil/neighbors/neighborsHelp.pptx
@@ -3540,8 +3540,8 @@
         </p:nvSpPr>
         <p:spPr>
           <a:xfrm>
-            <a:off x="22894" y="112889"/>
-            <a:ext cx="10299995" cy="10442221"/>
+            <a:off x="22894" y="56444"/>
+            <a:ext cx="10299995" cy="15183556"/>
           </a:xfrm>
           <a:prstGeom prst="roundRect">
             <a:avLst/>
@@ -3621,14 +3621,14 @@
       </p:sp>
       <p:sp>
         <p:nvSpPr>
-          <p:cNvPr id="6" name="TextBox 5"/>
+          <p:cNvPr id="7" name="TextBox 6"/>
           <p:cNvSpPr txBox="1"/>
           <p:nvPr/>
         </p:nvSpPr>
         <p:spPr>
           <a:xfrm>
-            <a:off x="-3264862" y="5860660"/>
-            <a:ext cx="3724593" cy="954107"/>
+            <a:off x="8044068" y="11215608"/>
+            <a:ext cx="2706771" cy="954107"/>
           </a:xfrm>
           <a:prstGeom prst="rect">
             <a:avLst/>
@@ -3646,7 +3646,7 @@
                 <a:latin typeface="Apple Casual"/>
                 <a:cs typeface="Apple Casual"/>
               </a:rPr>
-              <a:t>Click on a data point to see more info</a:t>
+              <a:t>Link to even more info</a:t>
             </a:r>
             <a:endParaRPr lang="en-US" sz="2800" dirty="0">
               <a:latin typeface="Apple Casual"/>
@@ -3655,168 +3655,6 @@
           </a:p>
         </p:txBody>
       </p:sp>
-      <p:sp>
-        <p:nvSpPr>
-          <p:cNvPr id="7" name="TextBox 6"/>
-          <p:cNvSpPr txBox="1"/>
-          <p:nvPr/>
-        </p:nvSpPr>
-        <p:spPr>
-          <a:xfrm>
-            <a:off x="-6751047" y="7599282"/>
-            <a:ext cx="4883167" cy="1384995"/>
-          </a:xfrm>
-          <a:prstGeom prst="rect">
-            <a:avLst/>
-          </a:prstGeom>
-          <a:noFill/>
-        </p:spPr>
-        <p:txBody>
-          <a:bodyPr wrap="square" rtlCol="0">
-            <a:spAutoFit/>
-          </a:bodyPr>
-          <a:lstStyle/>
-          <a:p>
-            <a:r>
-              <a:rPr lang="en-US" sz="2800" dirty="0" smtClean="0">
-                <a:latin typeface="Apple Casual"/>
-                <a:cs typeface="Apple Casual"/>
-              </a:rPr>
-              <a:t>Click on player name or season for even more info on basketball-</a:t>
-            </a:r>
-            <a:r>
-              <a:rPr lang="en-US" sz="2800" dirty="0" err="1" smtClean="0">
-                <a:latin typeface="Apple Casual"/>
-                <a:cs typeface="Apple Casual"/>
-              </a:rPr>
-              <a:t>reference.com</a:t>
-            </a:r>
-            <a:endParaRPr lang="en-US" sz="2800" dirty="0">
-              <a:latin typeface="Apple Casual"/>
-              <a:cs typeface="Apple Casual"/>
-            </a:endParaRPr>
-          </a:p>
-        </p:txBody>
-      </p:sp>
-      <p:cxnSp>
-        <p:nvCxnSpPr>
-          <p:cNvPr id="9" name="Curved Connector 8"/>
-          <p:cNvCxnSpPr/>
-          <p:nvPr/>
-        </p:nvCxnSpPr>
-        <p:spPr>
-          <a:xfrm rot="16200000" flipH="1" flipV="1">
-            <a:off x="-2749519" y="5893672"/>
-            <a:ext cx="416943" cy="2450224"/>
-          </a:xfrm>
-          <a:prstGeom prst="curvedConnector2">
-            <a:avLst/>
-          </a:prstGeom>
-          <a:ln w="38100" cmpd="sng">
-            <a:solidFill>
-              <a:srgbClr val="000000"/>
-            </a:solidFill>
-            <a:tailEnd type="arrow"/>
-          </a:ln>
-          <a:effectLst>
-            <a:outerShdw blurRad="50800" dist="38100" dir="2700000" algn="tl" rotWithShape="0">
-              <a:srgbClr val="000000">
-                <a:alpha val="43000"/>
-              </a:srgbClr>
-            </a:outerShdw>
-          </a:effectLst>
-        </p:spPr>
-        <p:style>
-          <a:lnRef idx="2">
-            <a:schemeClr val="accent1"/>
-          </a:lnRef>
-          <a:fillRef idx="0">
-            <a:schemeClr val="accent1"/>
-          </a:fillRef>
-          <a:effectRef idx="1">
-            <a:schemeClr val="accent1"/>
-          </a:effectRef>
-          <a:fontRef idx="minor">
-            <a:schemeClr val="tx1"/>
-          </a:fontRef>
-        </p:style>
-      </p:cxnSp>
-      <p:cxnSp>
-        <p:nvCxnSpPr>
-          <p:cNvPr id="12" name="Curved Connector 11"/>
-          <p:cNvCxnSpPr/>
-          <p:nvPr/>
-        </p:nvCxnSpPr>
-        <p:spPr>
-          <a:xfrm>
-            <a:off x="-2400635" y="7923220"/>
-            <a:ext cx="3364397" cy="520657"/>
-          </a:xfrm>
-          <a:prstGeom prst="curvedConnector3">
-            <a:avLst>
-              <a:gd name="adj1" fmla="val 50000"/>
-            </a:avLst>
-          </a:prstGeom>
-          <a:ln w="38100" cmpd="sng">
-            <a:solidFill>
-              <a:srgbClr val="000000"/>
-            </a:solidFill>
-            <a:tailEnd type="arrow"/>
-          </a:ln>
-        </p:spPr>
-        <p:style>
-          <a:lnRef idx="2">
-            <a:schemeClr val="accent1"/>
-          </a:lnRef>
-          <a:fillRef idx="0">
-            <a:schemeClr val="accent1"/>
-          </a:fillRef>
-          <a:effectRef idx="1">
-            <a:schemeClr val="accent1"/>
-          </a:effectRef>
-          <a:fontRef idx="minor">
-            <a:schemeClr val="tx1"/>
-          </a:fontRef>
-        </p:style>
-      </p:cxnSp>
-      <p:cxnSp>
-        <p:nvCxnSpPr>
-          <p:cNvPr id="13" name="Curved Connector 12"/>
-          <p:cNvCxnSpPr/>
-          <p:nvPr/>
-        </p:nvCxnSpPr>
-        <p:spPr>
-          <a:xfrm flipV="1">
-            <a:off x="-936935" y="7751380"/>
-            <a:ext cx="1022441" cy="306940"/>
-          </a:xfrm>
-          <a:prstGeom prst="curvedConnector3">
-            <a:avLst>
-              <a:gd name="adj1" fmla="val 35463"/>
-            </a:avLst>
-          </a:prstGeom>
-          <a:ln w="38100" cmpd="sng">
-            <a:solidFill>
-              <a:srgbClr val="000000"/>
-            </a:solidFill>
-            <a:tailEnd type="arrow"/>
-          </a:ln>
-        </p:spPr>
-        <p:style>
-          <a:lnRef idx="2">
-            <a:schemeClr val="accent1"/>
-          </a:lnRef>
-          <a:fillRef idx="0">
-            <a:schemeClr val="accent1"/>
-          </a:fillRef>
-          <a:effectRef idx="1">
-            <a:schemeClr val="accent1"/>
-          </a:effectRef>
-          <a:fontRef idx="minor">
-            <a:schemeClr val="tx1"/>
-          </a:fontRef>
-        </p:style>
-      </p:cxnSp>
       <p:pic>
         <p:nvPicPr>
           <p:cNvPr id="16" name="Picture 15" descr="Screen Shot 2014-09-08 at 9.34.26 AM.png"/>
@@ -3912,7 +3750,7 @@
         </p:blipFill>
         <p:spPr>
           <a:xfrm>
-            <a:off x="5682947" y="2818040"/>
+            <a:off x="5711169" y="2747485"/>
             <a:ext cx="3742729" cy="3742729"/>
           </a:xfrm>
           <a:prstGeom prst="rect">
@@ -3928,7 +3766,7 @@
         </p:nvCxnSpPr>
         <p:spPr>
           <a:xfrm rot="5400000" flipH="1" flipV="1">
-            <a:off x="4392356" y="3013452"/>
+            <a:off x="4420578" y="2942897"/>
             <a:ext cx="416943" cy="2450224"/>
           </a:xfrm>
           <a:prstGeom prst="curvedConnector2">
@@ -3965,7 +3803,7 @@
         </p:nvSpPr>
         <p:spPr>
           <a:xfrm>
-            <a:off x="362117" y="4329812"/>
+            <a:off x="390339" y="4259257"/>
             <a:ext cx="5218118" cy="1384995"/>
           </a:xfrm>
           <a:prstGeom prst="rect">
@@ -4028,7 +3866,7 @@
         </p:blipFill>
         <p:spPr>
           <a:xfrm>
-            <a:off x="856883" y="6910312"/>
+            <a:off x="673440" y="6938534"/>
             <a:ext cx="2950821" cy="2666475"/>
           </a:xfrm>
           <a:prstGeom prst="rect">
@@ -4044,7 +3882,7 @@
         </p:nvCxnSpPr>
         <p:spPr>
           <a:xfrm rot="16200000" flipH="1" flipV="1">
-            <a:off x="4073543" y="6487058"/>
+            <a:off x="3890100" y="6515280"/>
             <a:ext cx="416943" cy="2450224"/>
           </a:xfrm>
           <a:prstGeom prst="curvedConnector2">
@@ -4087,7 +3925,7 @@
         </p:nvSpPr>
         <p:spPr>
           <a:xfrm>
-            <a:off x="5537902" y="6995288"/>
+            <a:off x="5354459" y="7023510"/>
             <a:ext cx="4841431" cy="1384995"/>
           </a:xfrm>
           <a:prstGeom prst="rect">
@@ -4123,8 +3961,8 @@
         </p:nvCxnSpPr>
         <p:spPr>
           <a:xfrm rot="10800000">
-            <a:off x="2109040" y="8104886"/>
-            <a:ext cx="3013295" cy="714558"/>
+            <a:off x="1925599" y="8133108"/>
+            <a:ext cx="3059151" cy="912114"/>
           </a:xfrm>
           <a:prstGeom prst="curvedConnector3">
             <a:avLst>
@@ -4168,7 +4006,7 @@
         </p:nvSpPr>
         <p:spPr>
           <a:xfrm>
-            <a:off x="5168192" y="8528543"/>
+            <a:off x="5069415" y="8613209"/>
             <a:ext cx="4841431" cy="1384995"/>
           </a:xfrm>
           <a:prstGeom prst="rect">
@@ -4188,6 +4026,366 @@
                 <a:cs typeface="Apple Casual"/>
               </a:rPr>
               <a:t>And the closer a dot is to the center, the more similar it is to the chosen team</a:t>
+            </a:r>
+            <a:endParaRPr lang="en-US" sz="2800" dirty="0">
+              <a:latin typeface="Apple Casual"/>
+              <a:cs typeface="Apple Casual"/>
+            </a:endParaRPr>
+          </a:p>
+        </p:txBody>
+      </p:sp>
+      <p:pic>
+        <p:nvPicPr>
+          <p:cNvPr id="35" name="Picture 34" descr="Screen Shot 2014-09-09 at 12.47.13 AM.png"/>
+          <p:cNvPicPr>
+            <a:picLocks noChangeAspect="1"/>
+          </p:cNvPicPr>
+          <p:nvPr/>
+        </p:nvPicPr>
+        <p:blipFill rotWithShape="1">
+          <a:blip r:embed="rId5">
+            <a:extLst>
+              <a:ext uri="{28A0092B-C50C-407E-A947-70E740481C1C}">
+                <a14:useLocalDpi xmlns:a14="http://schemas.microsoft.com/office/drawing/2010/main" val="0"/>
+              </a:ext>
+            </a:extLst>
+          </a:blip>
+          <a:srcRect l="13498" t="17044" b="11237"/>
+          <a:stretch/>
+        </p:blipFill>
+        <p:spPr>
+          <a:xfrm>
+            <a:off x="2959971" y="11125967"/>
+            <a:ext cx="3504934" cy="3396826"/>
+          </a:xfrm>
+          <a:prstGeom prst="rect">
+            <a:avLst/>
+          </a:prstGeom>
+        </p:spPr>
+      </p:pic>
+      <p:cxnSp>
+        <p:nvCxnSpPr>
+          <p:cNvPr id="36" name="Curved Connector 35"/>
+          <p:cNvCxnSpPr/>
+          <p:nvPr/>
+        </p:nvCxnSpPr>
+        <p:spPr>
+          <a:xfrm rot="5400000" flipH="1" flipV="1">
+            <a:off x="2336969" y="9445810"/>
+            <a:ext cx="1171222" cy="962715"/>
+          </a:xfrm>
+          <a:prstGeom prst="curvedConnector3">
+            <a:avLst>
+              <a:gd name="adj1" fmla="val 50000"/>
+            </a:avLst>
+          </a:prstGeom>
+          <a:ln w="38100" cmpd="sng">
+            <a:solidFill>
+              <a:srgbClr val="000000"/>
+            </a:solidFill>
+            <a:tailEnd type="arrow"/>
+          </a:ln>
+          <a:effectLst>
+            <a:outerShdw blurRad="50800" dist="38100" dir="2700000" algn="tl" rotWithShape="0">
+              <a:srgbClr val="000000">
+                <a:alpha val="43000"/>
+              </a:srgbClr>
+            </a:outerShdw>
+          </a:effectLst>
+        </p:spPr>
+        <p:style>
+          <a:lnRef idx="2">
+            <a:schemeClr val="accent1"/>
+          </a:lnRef>
+          <a:fillRef idx="0">
+            <a:schemeClr val="accent1"/>
+          </a:fillRef>
+          <a:effectRef idx="1">
+            <a:schemeClr val="accent1"/>
+          </a:effectRef>
+          <a:fontRef idx="minor">
+            <a:schemeClr val="tx1"/>
+          </a:fontRef>
+        </p:style>
+      </p:cxnSp>
+      <p:sp>
+        <p:nvSpPr>
+          <p:cNvPr id="39" name="TextBox 38"/>
+          <p:cNvSpPr txBox="1"/>
+          <p:nvPr/>
+        </p:nvSpPr>
+        <p:spPr>
+          <a:xfrm>
+            <a:off x="459731" y="10385779"/>
+            <a:ext cx="5148726" cy="954107"/>
+          </a:xfrm>
+          <a:prstGeom prst="rect">
+            <a:avLst/>
+          </a:prstGeom>
+          <a:noFill/>
+        </p:spPr>
+        <p:txBody>
+          <a:bodyPr wrap="square" rtlCol="0">
+            <a:spAutoFit/>
+          </a:bodyPr>
+          <a:lstStyle/>
+          <a:p>
+            <a:r>
+              <a:rPr lang="en-US" sz="2800" dirty="0" smtClean="0">
+                <a:latin typeface="Apple Casual"/>
+                <a:cs typeface="Apple Casual"/>
+              </a:rPr>
+              <a:t>Click on a data point to see more info</a:t>
+            </a:r>
+            <a:endParaRPr lang="en-US" sz="2800" dirty="0">
+              <a:latin typeface="Apple Casual"/>
+              <a:cs typeface="Apple Casual"/>
+            </a:endParaRPr>
+          </a:p>
+        </p:txBody>
+      </p:sp>
+      <p:cxnSp>
+        <p:nvCxnSpPr>
+          <p:cNvPr id="40" name="Curved Connector 39"/>
+          <p:cNvCxnSpPr/>
+          <p:nvPr/>
+        </p:nvCxnSpPr>
+        <p:spPr>
+          <a:xfrm>
+            <a:off x="2201595" y="11168303"/>
+            <a:ext cx="1693072" cy="1320030"/>
+          </a:xfrm>
+          <a:prstGeom prst="curvedConnector3">
+            <a:avLst>
+              <a:gd name="adj1" fmla="val 50000"/>
+            </a:avLst>
+          </a:prstGeom>
+          <a:ln w="38100" cmpd="sng">
+            <a:solidFill>
+              <a:srgbClr val="000000"/>
+            </a:solidFill>
+            <a:tailEnd type="arrow"/>
+          </a:ln>
+          <a:effectLst>
+            <a:outerShdw blurRad="50800" dist="38100" dir="2700000" algn="tl" rotWithShape="0">
+              <a:srgbClr val="000000">
+                <a:alpha val="43000"/>
+              </a:srgbClr>
+            </a:outerShdw>
+          </a:effectLst>
+        </p:spPr>
+        <p:style>
+          <a:lnRef idx="2">
+            <a:schemeClr val="accent1"/>
+          </a:lnRef>
+          <a:fillRef idx="0">
+            <a:schemeClr val="accent1"/>
+          </a:fillRef>
+          <a:effectRef idx="1">
+            <a:schemeClr val="accent1"/>
+          </a:effectRef>
+          <a:fontRef idx="minor">
+            <a:schemeClr val="tx1"/>
+          </a:fontRef>
+        </p:style>
+      </p:cxnSp>
+      <p:cxnSp>
+        <p:nvCxnSpPr>
+          <p:cNvPr id="9" name="Curved Connector 8"/>
+          <p:cNvCxnSpPr/>
+          <p:nvPr/>
+        </p:nvCxnSpPr>
+        <p:spPr>
+          <a:xfrm rot="16200000" flipH="1" flipV="1">
+            <a:off x="6625098" y="10711602"/>
+            <a:ext cx="416943" cy="2450224"/>
+          </a:xfrm>
+          <a:prstGeom prst="curvedConnector2">
+            <a:avLst/>
+          </a:prstGeom>
+          <a:ln w="38100" cmpd="sng">
+            <a:solidFill>
+              <a:srgbClr val="000000"/>
+            </a:solidFill>
+            <a:tailEnd type="arrow"/>
+          </a:ln>
+          <a:effectLst>
+            <a:outerShdw blurRad="50800" dist="38100" dir="2700000" algn="tl" rotWithShape="0">
+              <a:srgbClr val="000000">
+                <a:alpha val="43000"/>
+              </a:srgbClr>
+            </a:outerShdw>
+          </a:effectLst>
+        </p:spPr>
+        <p:style>
+          <a:lnRef idx="2">
+            <a:schemeClr val="accent1"/>
+          </a:lnRef>
+          <a:fillRef idx="0">
+            <a:schemeClr val="accent1"/>
+          </a:fillRef>
+          <a:effectRef idx="1">
+            <a:schemeClr val="accent1"/>
+          </a:effectRef>
+          <a:fontRef idx="minor">
+            <a:schemeClr val="tx1"/>
+          </a:fontRef>
+        </p:style>
+      </p:cxnSp>
+      <p:cxnSp>
+        <p:nvCxnSpPr>
+          <p:cNvPr id="45" name="Curved Connector 44"/>
+          <p:cNvCxnSpPr/>
+          <p:nvPr/>
+        </p:nvCxnSpPr>
+        <p:spPr>
+          <a:xfrm rot="10800000">
+            <a:off x="5549195" y="12438324"/>
+            <a:ext cx="1492250" cy="318120"/>
+          </a:xfrm>
+          <a:prstGeom prst="curvedConnector3">
+            <a:avLst>
+              <a:gd name="adj1" fmla="val 50000"/>
+            </a:avLst>
+          </a:prstGeom>
+          <a:ln w="38100" cmpd="sng">
+            <a:solidFill>
+              <a:srgbClr val="000000"/>
+            </a:solidFill>
+            <a:tailEnd type="arrow"/>
+          </a:ln>
+          <a:effectLst>
+            <a:outerShdw blurRad="50800" dist="38100" dir="2700000" algn="tl" rotWithShape="0">
+              <a:srgbClr val="000000">
+                <a:alpha val="43000"/>
+              </a:srgbClr>
+            </a:outerShdw>
+          </a:effectLst>
+        </p:spPr>
+        <p:style>
+          <a:lnRef idx="2">
+            <a:schemeClr val="accent1"/>
+          </a:lnRef>
+          <a:fillRef idx="0">
+            <a:schemeClr val="accent1"/>
+          </a:fillRef>
+          <a:effectRef idx="1">
+            <a:schemeClr val="accent1"/>
+          </a:effectRef>
+          <a:fontRef idx="minor">
+            <a:schemeClr val="tx1"/>
+          </a:fontRef>
+        </p:style>
+      </p:cxnSp>
+      <p:sp>
+        <p:nvSpPr>
+          <p:cNvPr id="49" name="TextBox 48"/>
+          <p:cNvSpPr txBox="1"/>
+          <p:nvPr/>
+        </p:nvSpPr>
+        <p:spPr>
+          <a:xfrm>
+            <a:off x="7041445" y="12279390"/>
+            <a:ext cx="2706771" cy="954107"/>
+          </a:xfrm>
+          <a:prstGeom prst="rect">
+            <a:avLst/>
+          </a:prstGeom>
+          <a:noFill/>
+        </p:spPr>
+        <p:txBody>
+          <a:bodyPr wrap="square" rtlCol="0">
+            <a:spAutoFit/>
+          </a:bodyPr>
+          <a:lstStyle/>
+          <a:p>
+            <a:r>
+              <a:rPr lang="en-US" sz="2800" dirty="0" smtClean="0">
+                <a:latin typeface="Apple Casual"/>
+                <a:cs typeface="Apple Casual"/>
+              </a:rPr>
+              <a:t>Num. playoff series won</a:t>
+            </a:r>
+            <a:endParaRPr lang="en-US" sz="2800" dirty="0">
+              <a:latin typeface="Apple Casual"/>
+              <a:cs typeface="Apple Casual"/>
+            </a:endParaRPr>
+          </a:p>
+        </p:txBody>
+      </p:sp>
+      <p:cxnSp>
+        <p:nvCxnSpPr>
+          <p:cNvPr id="50" name="Curved Connector 49"/>
+          <p:cNvCxnSpPr/>
+          <p:nvPr/>
+        </p:nvCxnSpPr>
+        <p:spPr>
+          <a:xfrm rot="10800000">
+            <a:off x="5354459" y="13273008"/>
+            <a:ext cx="1799874" cy="318120"/>
+          </a:xfrm>
+          <a:prstGeom prst="curvedConnector3">
+            <a:avLst>
+              <a:gd name="adj1" fmla="val 50000"/>
+            </a:avLst>
+          </a:prstGeom>
+          <a:ln w="38100" cmpd="sng">
+            <a:solidFill>
+              <a:srgbClr val="000000"/>
+            </a:solidFill>
+            <a:tailEnd type="arrow"/>
+          </a:ln>
+          <a:effectLst>
+            <a:outerShdw blurRad="50800" dist="38100" dir="2700000" algn="tl" rotWithShape="0">
+              <a:srgbClr val="000000">
+                <a:alpha val="43000"/>
+              </a:srgbClr>
+            </a:outerShdw>
+          </a:effectLst>
+        </p:spPr>
+        <p:style>
+          <a:lnRef idx="2">
+            <a:schemeClr val="accent1"/>
+          </a:lnRef>
+          <a:fillRef idx="0">
+            <a:schemeClr val="accent1"/>
+          </a:fillRef>
+          <a:effectRef idx="1">
+            <a:schemeClr val="accent1"/>
+          </a:effectRef>
+          <a:fontRef idx="minor">
+            <a:schemeClr val="tx1"/>
+          </a:fontRef>
+        </p:style>
+      </p:cxnSp>
+      <p:sp>
+        <p:nvSpPr>
+          <p:cNvPr id="52" name="TextBox 51"/>
+          <p:cNvSpPr txBox="1"/>
+          <p:nvPr/>
+        </p:nvSpPr>
+        <p:spPr>
+          <a:xfrm>
+            <a:off x="7207956" y="13301296"/>
+            <a:ext cx="2706771" cy="1384995"/>
+          </a:xfrm>
+          <a:prstGeom prst="rect">
+            <a:avLst/>
+          </a:prstGeom>
+          <a:noFill/>
+        </p:spPr>
+        <p:txBody>
+          <a:bodyPr wrap="square" rtlCol="0">
+            <a:spAutoFit/>
+          </a:bodyPr>
+          <a:lstStyle/>
+          <a:p>
+            <a:r>
+              <a:rPr lang="en-US" sz="2800" dirty="0" smtClean="0">
+                <a:latin typeface="Apple Casual"/>
+                <a:cs typeface="Apple Casual"/>
+              </a:rPr>
+              <a:t>Most similar team stats to chosen team</a:t>
             </a:r>
             <a:endParaRPr lang="en-US" sz="2800" dirty="0">
               <a:latin typeface="Apple Casual"/>

</xml_diff>

<commit_message>
Added Coming Soon ribbon to neighbors project image in nikhil.html
</commit_message>
<xml_diff>
--- a/nikhil/neighbors/neighborsHelp.pptx
+++ b/nikhil/neighbors/neighborsHelp.pptx
@@ -3532,868 +3532,883 @@
           <a:chExt cx="0" cy="0"/>
         </a:xfrm>
       </p:grpSpPr>
-      <p:sp>
-        <p:nvSpPr>
-          <p:cNvPr id="4" name="Rounded Rectangle 3"/>
-          <p:cNvSpPr/>
+      <p:grpSp>
+        <p:nvGrpSpPr>
+          <p:cNvPr id="54" name="Group 53"/>
+          <p:cNvGrpSpPr/>
           <p:nvPr/>
-        </p:nvSpPr>
-        <p:spPr>
+        </p:nvGrpSpPr>
+        <p:grpSpPr>
           <a:xfrm>
             <a:off x="22894" y="56444"/>
-            <a:ext cx="10299995" cy="15183556"/>
+            <a:ext cx="10727945" cy="15183556"/>
+            <a:chOff x="22894" y="56444"/>
+            <a:chExt cx="10727945" cy="15183556"/>
           </a:xfrm>
-          <a:prstGeom prst="roundRect">
-            <a:avLst/>
-          </a:prstGeom>
-          <a:solidFill>
-            <a:srgbClr val="CCF5FF"/>
-          </a:solidFill>
-          <a:ln>
+        </p:grpSpPr>
+        <p:sp>
+          <p:nvSpPr>
+            <p:cNvPr id="4" name="Rounded Rectangle 3"/>
+            <p:cNvSpPr/>
+            <p:nvPr/>
+          </p:nvSpPr>
+          <p:spPr>
+            <a:xfrm>
+              <a:off x="22894" y="56444"/>
+              <a:ext cx="10299995" cy="15183556"/>
+            </a:xfrm>
+            <a:prstGeom prst="roundRect">
+              <a:avLst/>
+            </a:prstGeom>
+            <a:solidFill>
+              <a:srgbClr val="CCF5FF"/>
+            </a:solidFill>
+            <a:ln>
+              <a:noFill/>
+            </a:ln>
+          </p:spPr>
+          <p:style>
+            <a:lnRef idx="1">
+              <a:schemeClr val="accent1"/>
+            </a:lnRef>
+            <a:fillRef idx="3">
+              <a:schemeClr val="accent1"/>
+            </a:fillRef>
+            <a:effectRef idx="2">
+              <a:schemeClr val="accent1"/>
+            </a:effectRef>
+            <a:fontRef idx="minor">
+              <a:schemeClr val="lt1"/>
+            </a:fontRef>
+          </p:style>
+          <p:txBody>
+            <a:bodyPr rtlCol="0" anchor="ctr"/>
+            <a:lstStyle/>
+            <a:p>
+              <a:pPr algn="ctr"/>
+              <a:endParaRPr lang="en-US"/>
+            </a:p>
+          </p:txBody>
+        </p:sp>
+        <p:sp>
+          <p:nvSpPr>
+            <p:cNvPr id="5" name="TextBox 4"/>
+            <p:cNvSpPr txBox="1"/>
+            <p:nvPr/>
+          </p:nvSpPr>
+          <p:spPr>
+            <a:xfrm>
+              <a:off x="4671510" y="885621"/>
+              <a:ext cx="4272863" cy="954107"/>
+            </a:xfrm>
+            <a:prstGeom prst="rect">
+              <a:avLst/>
+            </a:prstGeom>
             <a:noFill/>
-          </a:ln>
-        </p:spPr>
-        <p:style>
-          <a:lnRef idx="1">
-            <a:schemeClr val="accent1"/>
-          </a:lnRef>
-          <a:fillRef idx="3">
-            <a:schemeClr val="accent1"/>
-          </a:fillRef>
-          <a:effectRef idx="2">
-            <a:schemeClr val="accent1"/>
-          </a:effectRef>
-          <a:fontRef idx="minor">
-            <a:schemeClr val="lt1"/>
-          </a:fontRef>
-        </p:style>
-        <p:txBody>
-          <a:bodyPr rtlCol="0" anchor="ctr"/>
-          <a:lstStyle/>
-          <a:p>
-            <a:pPr algn="ctr"/>
-            <a:endParaRPr lang="en-US"/>
-          </a:p>
-        </p:txBody>
-      </p:sp>
-      <p:sp>
-        <p:nvSpPr>
-          <p:cNvPr id="5" name="TextBox 4"/>
-          <p:cNvSpPr txBox="1"/>
-          <p:nvPr/>
-        </p:nvSpPr>
-        <p:spPr>
-          <a:xfrm>
-            <a:off x="4671510" y="885621"/>
-            <a:ext cx="4272863" cy="954107"/>
-          </a:xfrm>
-          <a:prstGeom prst="rect">
-            <a:avLst/>
-          </a:prstGeom>
-          <a:noFill/>
-        </p:spPr>
-        <p:txBody>
-          <a:bodyPr wrap="square" rtlCol="0">
-            <a:spAutoFit/>
-          </a:bodyPr>
-          <a:lstStyle/>
-          <a:p>
-            <a:r>
-              <a:rPr lang="en-US" sz="2800" dirty="0" smtClean="0">
+          </p:spPr>
+          <p:txBody>
+            <a:bodyPr wrap="square" rtlCol="0">
+              <a:spAutoFit/>
+            </a:bodyPr>
+            <a:lstStyle/>
+            <a:p>
+              <a:r>
+                <a:rPr lang="en-US" sz="2800" dirty="0" smtClean="0">
+                  <a:latin typeface="Apple Casual"/>
+                  <a:cs typeface="Apple Casual"/>
+                </a:rPr>
+                <a:t>Select a team to reveal its </a:t>
+              </a:r>
+              <a:r>
+                <a:rPr lang="en-US" sz="2800" dirty="0" smtClean="0">
+                  <a:latin typeface="Apple Casual"/>
+                  <a:cs typeface="Apple Casual"/>
+                </a:rPr>
+                <a:t>orbit</a:t>
+              </a:r>
+              <a:endParaRPr lang="en-US" sz="2800" dirty="0">
                 <a:latin typeface="Apple Casual"/>
                 <a:cs typeface="Apple Casual"/>
-              </a:rPr>
-              <a:t>Select a team to reveal its </a:t>
-            </a:r>
-            <a:r>
-              <a:rPr lang="en-US" sz="2800" dirty="0" smtClean="0">
+              </a:endParaRPr>
+            </a:p>
+          </p:txBody>
+        </p:sp>
+        <p:sp>
+          <p:nvSpPr>
+            <p:cNvPr id="7" name="TextBox 6"/>
+            <p:cNvSpPr txBox="1"/>
+            <p:nvPr/>
+          </p:nvSpPr>
+          <p:spPr>
+            <a:xfrm>
+              <a:off x="8044068" y="11215608"/>
+              <a:ext cx="2706771" cy="954107"/>
+            </a:xfrm>
+            <a:prstGeom prst="rect">
+              <a:avLst/>
+            </a:prstGeom>
+            <a:noFill/>
+          </p:spPr>
+          <p:txBody>
+            <a:bodyPr wrap="square" rtlCol="0">
+              <a:spAutoFit/>
+            </a:bodyPr>
+            <a:lstStyle/>
+            <a:p>
+              <a:r>
+                <a:rPr lang="en-US" sz="2800" dirty="0" smtClean="0">
+                  <a:latin typeface="Apple Casual"/>
+                  <a:cs typeface="Apple Casual"/>
+                </a:rPr>
+                <a:t>Link to even more info</a:t>
+              </a:r>
+              <a:endParaRPr lang="en-US" sz="2800" dirty="0">
                 <a:latin typeface="Apple Casual"/>
                 <a:cs typeface="Apple Casual"/>
-              </a:rPr>
-              <a:t>orbit</a:t>
-            </a:r>
-            <a:endParaRPr lang="en-US" sz="2800" dirty="0">
-              <a:latin typeface="Apple Casual"/>
-              <a:cs typeface="Apple Casual"/>
-            </a:endParaRPr>
-          </a:p>
-        </p:txBody>
-      </p:sp>
-      <p:sp>
-        <p:nvSpPr>
-          <p:cNvPr id="7" name="TextBox 6"/>
-          <p:cNvSpPr txBox="1"/>
-          <p:nvPr/>
-        </p:nvSpPr>
-        <p:spPr>
-          <a:xfrm>
-            <a:off x="8044068" y="11215608"/>
-            <a:ext cx="2706771" cy="954107"/>
-          </a:xfrm>
-          <a:prstGeom prst="rect">
-            <a:avLst/>
-          </a:prstGeom>
-          <a:noFill/>
-        </p:spPr>
-        <p:txBody>
-          <a:bodyPr wrap="square" rtlCol="0">
-            <a:spAutoFit/>
-          </a:bodyPr>
-          <a:lstStyle/>
-          <a:p>
-            <a:r>
-              <a:rPr lang="en-US" sz="2800" dirty="0" smtClean="0">
+              </a:endParaRPr>
+            </a:p>
+          </p:txBody>
+        </p:sp>
+        <p:pic>
+          <p:nvPicPr>
+            <p:cNvPr id="16" name="Picture 15" descr="Screen Shot 2014-09-08 at 9.34.26 AM.png"/>
+            <p:cNvPicPr>
+              <a:picLocks noChangeAspect="1"/>
+            </p:cNvPicPr>
+            <p:nvPr/>
+          </p:nvPicPr>
+          <p:blipFill>
+            <a:blip r:embed="rId3">
+              <a:extLst>
+                <a:ext uri="{28A0092B-C50C-407E-A947-70E740481C1C}">
+                  <a14:useLocalDpi xmlns:a14="http://schemas.microsoft.com/office/drawing/2010/main" val="0"/>
+                </a:ext>
+              </a:extLst>
+            </a:blip>
+            <a:stretch>
+              <a:fillRect/>
+            </a:stretch>
+          </p:blipFill>
+          <p:spPr>
+            <a:xfrm>
+              <a:off x="1061620" y="707673"/>
+              <a:ext cx="2413000" cy="2933700"/>
+            </a:xfrm>
+            <a:prstGeom prst="rect">
+              <a:avLst/>
+            </a:prstGeom>
+          </p:spPr>
+        </p:pic>
+        <p:cxnSp>
+          <p:nvCxnSpPr>
+            <p:cNvPr id="15" name="Curved Connector 14"/>
+            <p:cNvCxnSpPr/>
+            <p:nvPr/>
+          </p:nvCxnSpPr>
+          <p:spPr>
+            <a:xfrm rot="16200000" flipH="1" flipV="1">
+              <a:off x="2961318" y="387513"/>
+              <a:ext cx="416943" cy="2450224"/>
+            </a:xfrm>
+            <a:prstGeom prst="curvedConnector2">
+              <a:avLst/>
+            </a:prstGeom>
+            <a:ln w="38100" cmpd="sng">
+              <a:solidFill>
+                <a:srgbClr val="000000"/>
+              </a:solidFill>
+              <a:tailEnd type="arrow"/>
+            </a:ln>
+            <a:effectLst>
+              <a:outerShdw blurRad="50800" dist="38100" dir="2700000" algn="tl" rotWithShape="0">
+                <a:srgbClr val="000000">
+                  <a:alpha val="43000"/>
+                </a:srgbClr>
+              </a:outerShdw>
+            </a:effectLst>
+          </p:spPr>
+          <p:style>
+            <a:lnRef idx="2">
+              <a:schemeClr val="accent1"/>
+            </a:lnRef>
+            <a:fillRef idx="0">
+              <a:schemeClr val="accent1"/>
+            </a:fillRef>
+            <a:effectRef idx="1">
+              <a:schemeClr val="accent1"/>
+            </a:effectRef>
+            <a:fontRef idx="minor">
+              <a:schemeClr val="tx1"/>
+            </a:fontRef>
+          </p:style>
+        </p:cxnSp>
+        <p:pic>
+          <p:nvPicPr>
+            <p:cNvPr id="17" name="Picture 16" descr="Screen Shot 2014-09-08 at 9.39.13 AM.png"/>
+            <p:cNvPicPr>
+              <a:picLocks noChangeAspect="1"/>
+            </p:cNvPicPr>
+            <p:nvPr/>
+          </p:nvPicPr>
+          <p:blipFill>
+            <a:blip r:embed="rId4">
+              <a:extLst>
+                <a:ext uri="{28A0092B-C50C-407E-A947-70E740481C1C}">
+                  <a14:useLocalDpi xmlns:a14="http://schemas.microsoft.com/office/drawing/2010/main" val="0"/>
+                </a:ext>
+              </a:extLst>
+            </a:blip>
+            <a:stretch>
+              <a:fillRect/>
+            </a:stretch>
+          </p:blipFill>
+          <p:spPr>
+            <a:xfrm>
+              <a:off x="5711169" y="2747485"/>
+              <a:ext cx="3742729" cy="3742729"/>
+            </a:xfrm>
+            <a:prstGeom prst="rect">
+              <a:avLst/>
+            </a:prstGeom>
+          </p:spPr>
+        </p:pic>
+        <p:cxnSp>
+          <p:nvCxnSpPr>
+            <p:cNvPr id="10" name="Curved Connector 9"/>
+            <p:cNvCxnSpPr/>
+            <p:nvPr/>
+          </p:nvCxnSpPr>
+          <p:spPr>
+            <a:xfrm rot="5400000" flipH="1" flipV="1">
+              <a:off x="4420578" y="2942897"/>
+              <a:ext cx="416943" cy="2450224"/>
+            </a:xfrm>
+            <a:prstGeom prst="curvedConnector2">
+              <a:avLst/>
+            </a:prstGeom>
+            <a:ln w="38100" cmpd="sng">
+              <a:solidFill>
+                <a:srgbClr val="000000"/>
+              </a:solidFill>
+              <a:tailEnd type="arrow"/>
+            </a:ln>
+            <a:effectLst/>
+          </p:spPr>
+          <p:style>
+            <a:lnRef idx="2">
+              <a:schemeClr val="accent1"/>
+            </a:lnRef>
+            <a:fillRef idx="0">
+              <a:schemeClr val="accent1"/>
+            </a:fillRef>
+            <a:effectRef idx="1">
+              <a:schemeClr val="accent1"/>
+            </a:effectRef>
+            <a:fontRef idx="minor">
+              <a:schemeClr val="tx1"/>
+            </a:fontRef>
+          </p:style>
+        </p:cxnSp>
+        <p:sp>
+          <p:nvSpPr>
+            <p:cNvPr id="27" name="TextBox 26"/>
+            <p:cNvSpPr txBox="1"/>
+            <p:nvPr/>
+          </p:nvSpPr>
+          <p:spPr>
+            <a:xfrm>
+              <a:off x="390339" y="4259257"/>
+              <a:ext cx="5218118" cy="1384995"/>
+            </a:xfrm>
+            <a:prstGeom prst="rect">
+              <a:avLst/>
+            </a:prstGeom>
+            <a:noFill/>
+          </p:spPr>
+          <p:txBody>
+            <a:bodyPr wrap="square" rtlCol="0">
+              <a:spAutoFit/>
+            </a:bodyPr>
+            <a:lstStyle/>
+            <a:p>
+              <a:r>
+                <a:rPr lang="en-US" sz="2800" dirty="0" smtClean="0">
+                  <a:latin typeface="Apple Casual"/>
+                  <a:cs typeface="Apple Casual"/>
+                </a:rPr>
+                <a:t>Colore</a:t>
+              </a:r>
+              <a:r>
+                <a:rPr lang="en-US" sz="2800" dirty="0" smtClean="0">
+                  <a:latin typeface="Apple Casual"/>
+                  <a:cs typeface="Apple Casual"/>
+                </a:rPr>
+                <a:t>d </a:t>
+              </a:r>
+              <a:r>
+                <a:rPr lang="en-US" sz="2800" dirty="0" smtClean="0">
+                  <a:latin typeface="Apple Casual"/>
+                  <a:cs typeface="Apple Casual"/>
+                </a:rPr>
+                <a:t>dots are past playoff teams most similar to the chosen team (in the center) </a:t>
+              </a:r>
+              <a:endParaRPr lang="en-US" sz="2800" dirty="0">
                 <a:latin typeface="Apple Casual"/>
                 <a:cs typeface="Apple Casual"/>
-              </a:rPr>
-              <a:t>Link to even more info</a:t>
-            </a:r>
-            <a:endParaRPr lang="en-US" sz="2800" dirty="0">
-              <a:latin typeface="Apple Casual"/>
-              <a:cs typeface="Apple Casual"/>
-            </a:endParaRPr>
-          </a:p>
-        </p:txBody>
-      </p:sp>
-      <p:pic>
-        <p:nvPicPr>
-          <p:cNvPr id="16" name="Picture 15" descr="Screen Shot 2014-09-08 at 9.34.26 AM.png"/>
-          <p:cNvPicPr>
-            <a:picLocks noChangeAspect="1"/>
-          </p:cNvPicPr>
-          <p:nvPr/>
-        </p:nvPicPr>
-        <p:blipFill>
-          <a:blip r:embed="rId3">
-            <a:extLst>
-              <a:ext uri="{28A0092B-C50C-407E-A947-70E740481C1C}">
-                <a14:useLocalDpi xmlns:a14="http://schemas.microsoft.com/office/drawing/2010/main" val="0"/>
-              </a:ext>
-            </a:extLst>
-          </a:blip>
-          <a:stretch>
-            <a:fillRect/>
-          </a:stretch>
-        </p:blipFill>
-        <p:spPr>
-          <a:xfrm>
-            <a:off x="1061620" y="707673"/>
-            <a:ext cx="2413000" cy="2933700"/>
-          </a:xfrm>
-          <a:prstGeom prst="rect">
-            <a:avLst/>
-          </a:prstGeom>
-        </p:spPr>
-      </p:pic>
-      <p:cxnSp>
-        <p:nvCxnSpPr>
-          <p:cNvPr id="15" name="Curved Connector 14"/>
-          <p:cNvCxnSpPr/>
-          <p:nvPr/>
-        </p:nvCxnSpPr>
-        <p:spPr>
-          <a:xfrm rot="16200000" flipH="1" flipV="1">
-            <a:off x="2961318" y="387513"/>
-            <a:ext cx="416943" cy="2450224"/>
-          </a:xfrm>
-          <a:prstGeom prst="curvedConnector2">
-            <a:avLst/>
-          </a:prstGeom>
-          <a:ln w="38100" cmpd="sng">
-            <a:solidFill>
-              <a:srgbClr val="000000"/>
-            </a:solidFill>
-            <a:tailEnd type="arrow"/>
-          </a:ln>
-          <a:effectLst>
-            <a:outerShdw blurRad="50800" dist="38100" dir="2700000" algn="tl" rotWithShape="0">
-              <a:srgbClr val="000000">
-                <a:alpha val="43000"/>
-              </a:srgbClr>
-            </a:outerShdw>
-          </a:effectLst>
-        </p:spPr>
-        <p:style>
-          <a:lnRef idx="2">
-            <a:schemeClr val="accent1"/>
-          </a:lnRef>
-          <a:fillRef idx="0">
-            <a:schemeClr val="accent1"/>
-          </a:fillRef>
-          <a:effectRef idx="1">
-            <a:schemeClr val="accent1"/>
-          </a:effectRef>
-          <a:fontRef idx="minor">
-            <a:schemeClr val="tx1"/>
-          </a:fontRef>
-        </p:style>
-      </p:cxnSp>
-      <p:pic>
-        <p:nvPicPr>
-          <p:cNvPr id="17" name="Picture 16" descr="Screen Shot 2014-09-08 at 9.39.13 AM.png"/>
-          <p:cNvPicPr>
-            <a:picLocks noChangeAspect="1"/>
-          </p:cNvPicPr>
-          <p:nvPr/>
-        </p:nvPicPr>
-        <p:blipFill>
-          <a:blip r:embed="rId4">
-            <a:extLst>
-              <a:ext uri="{28A0092B-C50C-407E-A947-70E740481C1C}">
-                <a14:useLocalDpi xmlns:a14="http://schemas.microsoft.com/office/drawing/2010/main" val="0"/>
-              </a:ext>
-            </a:extLst>
-          </a:blip>
-          <a:stretch>
-            <a:fillRect/>
-          </a:stretch>
-        </p:blipFill>
-        <p:spPr>
-          <a:xfrm>
-            <a:off x="5711169" y="2747485"/>
-            <a:ext cx="3742729" cy="3742729"/>
-          </a:xfrm>
-          <a:prstGeom prst="rect">
-            <a:avLst/>
-          </a:prstGeom>
-        </p:spPr>
-      </p:pic>
-      <p:cxnSp>
-        <p:nvCxnSpPr>
-          <p:cNvPr id="10" name="Curved Connector 9"/>
-          <p:cNvCxnSpPr/>
-          <p:nvPr/>
-        </p:nvCxnSpPr>
-        <p:spPr>
-          <a:xfrm rot="5400000" flipH="1" flipV="1">
-            <a:off x="4420578" y="2942897"/>
-            <a:ext cx="416943" cy="2450224"/>
-          </a:xfrm>
-          <a:prstGeom prst="curvedConnector2">
-            <a:avLst/>
-          </a:prstGeom>
-          <a:ln w="38100" cmpd="sng">
-            <a:solidFill>
-              <a:srgbClr val="000000"/>
-            </a:solidFill>
-            <a:tailEnd type="arrow"/>
-          </a:ln>
-          <a:effectLst/>
-        </p:spPr>
-        <p:style>
-          <a:lnRef idx="2">
-            <a:schemeClr val="accent1"/>
-          </a:lnRef>
-          <a:fillRef idx="0">
-            <a:schemeClr val="accent1"/>
-          </a:fillRef>
-          <a:effectRef idx="1">
-            <a:schemeClr val="accent1"/>
-          </a:effectRef>
-          <a:fontRef idx="minor">
-            <a:schemeClr val="tx1"/>
-          </a:fontRef>
-        </p:style>
-      </p:cxnSp>
-      <p:sp>
-        <p:nvSpPr>
-          <p:cNvPr id="27" name="TextBox 26"/>
-          <p:cNvSpPr txBox="1"/>
-          <p:nvPr/>
-        </p:nvSpPr>
-        <p:spPr>
-          <a:xfrm>
-            <a:off x="390339" y="4259257"/>
-            <a:ext cx="5218118" cy="1384995"/>
-          </a:xfrm>
-          <a:prstGeom prst="rect">
-            <a:avLst/>
-          </a:prstGeom>
-          <a:noFill/>
-        </p:spPr>
-        <p:txBody>
-          <a:bodyPr wrap="square" rtlCol="0">
-            <a:spAutoFit/>
-          </a:bodyPr>
-          <a:lstStyle/>
-          <a:p>
-            <a:r>
-              <a:rPr lang="en-US" sz="2800" dirty="0" smtClean="0">
+              </a:endParaRPr>
+            </a:p>
+          </p:txBody>
+        </p:sp>
+        <p:pic>
+          <p:nvPicPr>
+            <p:cNvPr id="28" name="Picture 27" descr="Screen Shot 2014-09-08 at 9.39.13 AM.png"/>
+            <p:cNvPicPr>
+              <a:picLocks noChangeAspect="1"/>
+            </p:cNvPicPr>
+            <p:nvPr/>
+          </p:nvPicPr>
+          <p:blipFill rotWithShape="1">
+            <a:blip r:embed="rId4">
+              <a:extLst>
+                <a:ext uri="{28A0092B-C50C-407E-A947-70E740481C1C}">
+                  <a14:useLocalDpi xmlns:a14="http://schemas.microsoft.com/office/drawing/2010/main" val="0"/>
+                </a:ext>
+              </a:extLst>
+            </a:blip>
+            <a:srcRect l="36830" t="-562" b="43480"/>
+            <a:stretch/>
+          </p:blipFill>
+          <p:spPr>
+            <a:xfrm>
+              <a:off x="673440" y="6938534"/>
+              <a:ext cx="2950821" cy="2666475"/>
+            </a:xfrm>
+            <a:prstGeom prst="rect">
+              <a:avLst/>
+            </a:prstGeom>
+          </p:spPr>
+        </p:pic>
+        <p:cxnSp>
+          <p:nvCxnSpPr>
+            <p:cNvPr id="29" name="Curved Connector 28"/>
+            <p:cNvCxnSpPr/>
+            <p:nvPr/>
+          </p:nvCxnSpPr>
+          <p:spPr>
+            <a:xfrm rot="16200000" flipH="1" flipV="1">
+              <a:off x="3890100" y="6515280"/>
+              <a:ext cx="416943" cy="2450224"/>
+            </a:xfrm>
+            <a:prstGeom prst="curvedConnector2">
+              <a:avLst/>
+            </a:prstGeom>
+            <a:ln w="38100" cmpd="sng">
+              <a:solidFill>
+                <a:srgbClr val="000000"/>
+              </a:solidFill>
+              <a:tailEnd type="arrow"/>
+            </a:ln>
+            <a:effectLst>
+              <a:outerShdw blurRad="50800" dist="38100" dir="2700000" algn="tl" rotWithShape="0">
+                <a:srgbClr val="000000">
+                  <a:alpha val="43000"/>
+                </a:srgbClr>
+              </a:outerShdw>
+            </a:effectLst>
+          </p:spPr>
+          <p:style>
+            <a:lnRef idx="2">
+              <a:schemeClr val="accent1"/>
+            </a:lnRef>
+            <a:fillRef idx="0">
+              <a:schemeClr val="accent1"/>
+            </a:fillRef>
+            <a:effectRef idx="1">
+              <a:schemeClr val="accent1"/>
+            </a:effectRef>
+            <a:fontRef idx="minor">
+              <a:schemeClr val="tx1"/>
+            </a:fontRef>
+          </p:style>
+        </p:cxnSp>
+        <p:sp>
+          <p:nvSpPr>
+            <p:cNvPr id="30" name="TextBox 29"/>
+            <p:cNvSpPr txBox="1"/>
+            <p:nvPr/>
+          </p:nvSpPr>
+          <p:spPr>
+            <a:xfrm>
+              <a:off x="5354459" y="7023510"/>
+              <a:ext cx="4841431" cy="1384995"/>
+            </a:xfrm>
+            <a:prstGeom prst="rect">
+              <a:avLst/>
+            </a:prstGeom>
+            <a:noFill/>
+          </p:spPr>
+          <p:txBody>
+            <a:bodyPr wrap="square" rtlCol="0">
+              <a:spAutoFit/>
+            </a:bodyPr>
+            <a:lstStyle/>
+            <a:p>
+              <a:r>
+                <a:rPr lang="en-US" sz="2800" dirty="0" smtClean="0">
+                  <a:latin typeface="Apple Casual"/>
+                  <a:cs typeface="Apple Casual"/>
+                </a:rPr>
+                <a:t>The bigger the dot, the more successful that team was in the playoffs</a:t>
+              </a:r>
+              <a:endParaRPr lang="en-US" sz="2800" dirty="0">
                 <a:latin typeface="Apple Casual"/>
                 <a:cs typeface="Apple Casual"/>
-              </a:rPr>
-              <a:t>Colore</a:t>
-            </a:r>
-            <a:r>
-              <a:rPr lang="en-US" sz="2800" dirty="0" smtClean="0">
+              </a:endParaRPr>
+            </a:p>
+          </p:txBody>
+        </p:sp>
+        <p:cxnSp>
+          <p:nvCxnSpPr>
+            <p:cNvPr id="31" name="Curved Connector 30"/>
+            <p:cNvCxnSpPr/>
+            <p:nvPr/>
+          </p:nvCxnSpPr>
+          <p:spPr>
+            <a:xfrm rot="10800000">
+              <a:off x="1925599" y="8133108"/>
+              <a:ext cx="3059151" cy="912114"/>
+            </a:xfrm>
+            <a:prstGeom prst="curvedConnector3">
+              <a:avLst>
+                <a:gd name="adj1" fmla="val 50000"/>
+              </a:avLst>
+            </a:prstGeom>
+            <a:ln w="38100" cmpd="sng">
+              <a:solidFill>
+                <a:srgbClr val="000000"/>
+              </a:solidFill>
+              <a:tailEnd type="arrow"/>
+            </a:ln>
+            <a:effectLst>
+              <a:outerShdw blurRad="50800" dist="38100" dir="2700000" algn="tl" rotWithShape="0">
+                <a:srgbClr val="000000">
+                  <a:alpha val="43000"/>
+                </a:srgbClr>
+              </a:outerShdw>
+            </a:effectLst>
+          </p:spPr>
+          <p:style>
+            <a:lnRef idx="2">
+              <a:schemeClr val="accent1"/>
+            </a:lnRef>
+            <a:fillRef idx="0">
+              <a:schemeClr val="accent1"/>
+            </a:fillRef>
+            <a:effectRef idx="1">
+              <a:schemeClr val="accent1"/>
+            </a:effectRef>
+            <a:fontRef idx="minor">
+              <a:schemeClr val="tx1"/>
+            </a:fontRef>
+          </p:style>
+        </p:cxnSp>
+        <p:sp>
+          <p:nvSpPr>
+            <p:cNvPr id="33" name="TextBox 32"/>
+            <p:cNvSpPr txBox="1"/>
+            <p:nvPr/>
+          </p:nvSpPr>
+          <p:spPr>
+            <a:xfrm>
+              <a:off x="5069415" y="8613209"/>
+              <a:ext cx="4841431" cy="1384995"/>
+            </a:xfrm>
+            <a:prstGeom prst="rect">
+              <a:avLst/>
+            </a:prstGeom>
+            <a:noFill/>
+          </p:spPr>
+          <p:txBody>
+            <a:bodyPr wrap="square" rtlCol="0">
+              <a:spAutoFit/>
+            </a:bodyPr>
+            <a:lstStyle/>
+            <a:p>
+              <a:r>
+                <a:rPr lang="en-US" sz="2800" dirty="0" smtClean="0">
+                  <a:latin typeface="Apple Casual"/>
+                  <a:cs typeface="Apple Casual"/>
+                </a:rPr>
+                <a:t>And the closer a dot is to the center, the more similar it is to the chosen team</a:t>
+              </a:r>
+              <a:endParaRPr lang="en-US" sz="2800" dirty="0">
                 <a:latin typeface="Apple Casual"/>
                 <a:cs typeface="Apple Casual"/>
-              </a:rPr>
-              <a:t>d </a:t>
-            </a:r>
-            <a:r>
-              <a:rPr lang="en-US" sz="2800" dirty="0" smtClean="0">
+              </a:endParaRPr>
+            </a:p>
+          </p:txBody>
+        </p:sp>
+        <p:pic>
+          <p:nvPicPr>
+            <p:cNvPr id="35" name="Picture 34" descr="Screen Shot 2014-09-09 at 12.47.13 AM.png"/>
+            <p:cNvPicPr>
+              <a:picLocks noChangeAspect="1"/>
+            </p:cNvPicPr>
+            <p:nvPr/>
+          </p:nvPicPr>
+          <p:blipFill rotWithShape="1">
+            <a:blip r:embed="rId5">
+              <a:extLst>
+                <a:ext uri="{28A0092B-C50C-407E-A947-70E740481C1C}">
+                  <a14:useLocalDpi xmlns:a14="http://schemas.microsoft.com/office/drawing/2010/main" val="0"/>
+                </a:ext>
+              </a:extLst>
+            </a:blip>
+            <a:srcRect l="13498" t="17044" b="11237"/>
+            <a:stretch/>
+          </p:blipFill>
+          <p:spPr>
+            <a:xfrm>
+              <a:off x="2959971" y="11125967"/>
+              <a:ext cx="3504934" cy="3396826"/>
+            </a:xfrm>
+            <a:prstGeom prst="rect">
+              <a:avLst/>
+            </a:prstGeom>
+          </p:spPr>
+        </p:pic>
+        <p:cxnSp>
+          <p:nvCxnSpPr>
+            <p:cNvPr id="36" name="Curved Connector 35"/>
+            <p:cNvCxnSpPr/>
+            <p:nvPr/>
+          </p:nvCxnSpPr>
+          <p:spPr>
+            <a:xfrm rot="5400000" flipH="1" flipV="1">
+              <a:off x="2336969" y="9445810"/>
+              <a:ext cx="1171222" cy="962715"/>
+            </a:xfrm>
+            <a:prstGeom prst="curvedConnector3">
+              <a:avLst>
+                <a:gd name="adj1" fmla="val 50000"/>
+              </a:avLst>
+            </a:prstGeom>
+            <a:ln w="38100" cmpd="sng">
+              <a:solidFill>
+                <a:srgbClr val="000000"/>
+              </a:solidFill>
+              <a:tailEnd type="arrow"/>
+            </a:ln>
+            <a:effectLst>
+              <a:outerShdw blurRad="50800" dist="38100" dir="2700000" algn="tl" rotWithShape="0">
+                <a:srgbClr val="000000">
+                  <a:alpha val="43000"/>
+                </a:srgbClr>
+              </a:outerShdw>
+            </a:effectLst>
+          </p:spPr>
+          <p:style>
+            <a:lnRef idx="2">
+              <a:schemeClr val="accent1"/>
+            </a:lnRef>
+            <a:fillRef idx="0">
+              <a:schemeClr val="accent1"/>
+            </a:fillRef>
+            <a:effectRef idx="1">
+              <a:schemeClr val="accent1"/>
+            </a:effectRef>
+            <a:fontRef idx="minor">
+              <a:schemeClr val="tx1"/>
+            </a:fontRef>
+          </p:style>
+        </p:cxnSp>
+        <p:sp>
+          <p:nvSpPr>
+            <p:cNvPr id="39" name="TextBox 38"/>
+            <p:cNvSpPr txBox="1"/>
+            <p:nvPr/>
+          </p:nvSpPr>
+          <p:spPr>
+            <a:xfrm>
+              <a:off x="459731" y="10385779"/>
+              <a:ext cx="5148726" cy="954107"/>
+            </a:xfrm>
+            <a:prstGeom prst="rect">
+              <a:avLst/>
+            </a:prstGeom>
+            <a:noFill/>
+          </p:spPr>
+          <p:txBody>
+            <a:bodyPr wrap="square" rtlCol="0">
+              <a:spAutoFit/>
+            </a:bodyPr>
+            <a:lstStyle/>
+            <a:p>
+              <a:r>
+                <a:rPr lang="en-US" sz="2800" dirty="0" smtClean="0">
+                  <a:latin typeface="Apple Casual"/>
+                  <a:cs typeface="Apple Casual"/>
+                </a:rPr>
+                <a:t>Click on a data point to see more info</a:t>
+              </a:r>
+              <a:endParaRPr lang="en-US" sz="2800" dirty="0">
                 <a:latin typeface="Apple Casual"/>
                 <a:cs typeface="Apple Casual"/>
-              </a:rPr>
-              <a:t>dots are past playoff teams most similar to the chosen team (in the center) </a:t>
-            </a:r>
-            <a:endParaRPr lang="en-US" sz="2800" dirty="0">
-              <a:latin typeface="Apple Casual"/>
-              <a:cs typeface="Apple Casual"/>
-            </a:endParaRPr>
-          </a:p>
-        </p:txBody>
-      </p:sp>
-      <p:pic>
-        <p:nvPicPr>
-          <p:cNvPr id="28" name="Picture 27" descr="Screen Shot 2014-09-08 at 9.39.13 AM.png"/>
-          <p:cNvPicPr>
-            <a:picLocks noChangeAspect="1"/>
-          </p:cNvPicPr>
-          <p:nvPr/>
-        </p:nvPicPr>
-        <p:blipFill rotWithShape="1">
-          <a:blip r:embed="rId4">
-            <a:extLst>
-              <a:ext uri="{28A0092B-C50C-407E-A947-70E740481C1C}">
-                <a14:useLocalDpi xmlns:a14="http://schemas.microsoft.com/office/drawing/2010/main" val="0"/>
-              </a:ext>
-            </a:extLst>
-          </a:blip>
-          <a:srcRect l="36830" t="-562" b="43480"/>
-          <a:stretch/>
-        </p:blipFill>
-        <p:spPr>
-          <a:xfrm>
-            <a:off x="673440" y="6938534"/>
-            <a:ext cx="2950821" cy="2666475"/>
-          </a:xfrm>
-          <a:prstGeom prst="rect">
-            <a:avLst/>
-          </a:prstGeom>
-        </p:spPr>
-      </p:pic>
-      <p:cxnSp>
-        <p:nvCxnSpPr>
-          <p:cNvPr id="29" name="Curved Connector 28"/>
-          <p:cNvCxnSpPr/>
-          <p:nvPr/>
-        </p:nvCxnSpPr>
-        <p:spPr>
-          <a:xfrm rot="16200000" flipH="1" flipV="1">
-            <a:off x="3890100" y="6515280"/>
-            <a:ext cx="416943" cy="2450224"/>
-          </a:xfrm>
-          <a:prstGeom prst="curvedConnector2">
-            <a:avLst/>
-          </a:prstGeom>
-          <a:ln w="38100" cmpd="sng">
-            <a:solidFill>
-              <a:srgbClr val="000000"/>
-            </a:solidFill>
-            <a:tailEnd type="arrow"/>
-          </a:ln>
-          <a:effectLst>
-            <a:outerShdw blurRad="50800" dist="38100" dir="2700000" algn="tl" rotWithShape="0">
-              <a:srgbClr val="000000">
-                <a:alpha val="43000"/>
-              </a:srgbClr>
-            </a:outerShdw>
-          </a:effectLst>
-        </p:spPr>
-        <p:style>
-          <a:lnRef idx="2">
-            <a:schemeClr val="accent1"/>
-          </a:lnRef>
-          <a:fillRef idx="0">
-            <a:schemeClr val="accent1"/>
-          </a:fillRef>
-          <a:effectRef idx="1">
-            <a:schemeClr val="accent1"/>
-          </a:effectRef>
-          <a:fontRef idx="minor">
-            <a:schemeClr val="tx1"/>
-          </a:fontRef>
-        </p:style>
-      </p:cxnSp>
-      <p:sp>
-        <p:nvSpPr>
-          <p:cNvPr id="30" name="TextBox 29"/>
-          <p:cNvSpPr txBox="1"/>
-          <p:nvPr/>
-        </p:nvSpPr>
-        <p:spPr>
-          <a:xfrm>
-            <a:off x="5354459" y="7023510"/>
-            <a:ext cx="4841431" cy="1384995"/>
-          </a:xfrm>
-          <a:prstGeom prst="rect">
-            <a:avLst/>
-          </a:prstGeom>
-          <a:noFill/>
-        </p:spPr>
-        <p:txBody>
-          <a:bodyPr wrap="square" rtlCol="0">
-            <a:spAutoFit/>
-          </a:bodyPr>
-          <a:lstStyle/>
-          <a:p>
-            <a:r>
-              <a:rPr lang="en-US" sz="2800" dirty="0" smtClean="0">
+              </a:endParaRPr>
+            </a:p>
+          </p:txBody>
+        </p:sp>
+        <p:cxnSp>
+          <p:nvCxnSpPr>
+            <p:cNvPr id="40" name="Curved Connector 39"/>
+            <p:cNvCxnSpPr/>
+            <p:nvPr/>
+          </p:nvCxnSpPr>
+          <p:spPr>
+            <a:xfrm>
+              <a:off x="2201595" y="11168303"/>
+              <a:ext cx="1693072" cy="1320030"/>
+            </a:xfrm>
+            <a:prstGeom prst="curvedConnector3">
+              <a:avLst>
+                <a:gd name="adj1" fmla="val 50000"/>
+              </a:avLst>
+            </a:prstGeom>
+            <a:ln w="38100" cmpd="sng">
+              <a:solidFill>
+                <a:srgbClr val="000000"/>
+              </a:solidFill>
+              <a:tailEnd type="arrow"/>
+            </a:ln>
+            <a:effectLst>
+              <a:outerShdw blurRad="50800" dist="38100" dir="2700000" algn="tl" rotWithShape="0">
+                <a:srgbClr val="000000">
+                  <a:alpha val="43000"/>
+                </a:srgbClr>
+              </a:outerShdw>
+            </a:effectLst>
+          </p:spPr>
+          <p:style>
+            <a:lnRef idx="2">
+              <a:schemeClr val="accent1"/>
+            </a:lnRef>
+            <a:fillRef idx="0">
+              <a:schemeClr val="accent1"/>
+            </a:fillRef>
+            <a:effectRef idx="1">
+              <a:schemeClr val="accent1"/>
+            </a:effectRef>
+            <a:fontRef idx="minor">
+              <a:schemeClr val="tx1"/>
+            </a:fontRef>
+          </p:style>
+        </p:cxnSp>
+        <p:cxnSp>
+          <p:nvCxnSpPr>
+            <p:cNvPr id="9" name="Curved Connector 8"/>
+            <p:cNvCxnSpPr/>
+            <p:nvPr/>
+          </p:nvCxnSpPr>
+          <p:spPr>
+            <a:xfrm rot="16200000" flipH="1" flipV="1">
+              <a:off x="6625098" y="10711602"/>
+              <a:ext cx="416943" cy="2450224"/>
+            </a:xfrm>
+            <a:prstGeom prst="curvedConnector2">
+              <a:avLst/>
+            </a:prstGeom>
+            <a:ln w="38100" cmpd="sng">
+              <a:solidFill>
+                <a:srgbClr val="000000"/>
+              </a:solidFill>
+              <a:tailEnd type="arrow"/>
+            </a:ln>
+            <a:effectLst>
+              <a:outerShdw blurRad="50800" dist="38100" dir="2700000" algn="tl" rotWithShape="0">
+                <a:srgbClr val="000000">
+                  <a:alpha val="43000"/>
+                </a:srgbClr>
+              </a:outerShdw>
+            </a:effectLst>
+          </p:spPr>
+          <p:style>
+            <a:lnRef idx="2">
+              <a:schemeClr val="accent1"/>
+            </a:lnRef>
+            <a:fillRef idx="0">
+              <a:schemeClr val="accent1"/>
+            </a:fillRef>
+            <a:effectRef idx="1">
+              <a:schemeClr val="accent1"/>
+            </a:effectRef>
+            <a:fontRef idx="minor">
+              <a:schemeClr val="tx1"/>
+            </a:fontRef>
+          </p:style>
+        </p:cxnSp>
+        <p:cxnSp>
+          <p:nvCxnSpPr>
+            <p:cNvPr id="45" name="Curved Connector 44"/>
+            <p:cNvCxnSpPr/>
+            <p:nvPr/>
+          </p:nvCxnSpPr>
+          <p:spPr>
+            <a:xfrm rot="10800000">
+              <a:off x="5549195" y="12438324"/>
+              <a:ext cx="1492250" cy="318120"/>
+            </a:xfrm>
+            <a:prstGeom prst="curvedConnector3">
+              <a:avLst>
+                <a:gd name="adj1" fmla="val 50000"/>
+              </a:avLst>
+            </a:prstGeom>
+            <a:ln w="38100" cmpd="sng">
+              <a:solidFill>
+                <a:srgbClr val="000000"/>
+              </a:solidFill>
+              <a:tailEnd type="arrow"/>
+            </a:ln>
+            <a:effectLst>
+              <a:outerShdw blurRad="50800" dist="38100" dir="2700000" algn="tl" rotWithShape="0">
+                <a:srgbClr val="000000">
+                  <a:alpha val="43000"/>
+                </a:srgbClr>
+              </a:outerShdw>
+            </a:effectLst>
+          </p:spPr>
+          <p:style>
+            <a:lnRef idx="2">
+              <a:schemeClr val="accent1"/>
+            </a:lnRef>
+            <a:fillRef idx="0">
+              <a:schemeClr val="accent1"/>
+            </a:fillRef>
+            <a:effectRef idx="1">
+              <a:schemeClr val="accent1"/>
+            </a:effectRef>
+            <a:fontRef idx="minor">
+              <a:schemeClr val="tx1"/>
+            </a:fontRef>
+          </p:style>
+        </p:cxnSp>
+        <p:sp>
+          <p:nvSpPr>
+            <p:cNvPr id="49" name="TextBox 48"/>
+            <p:cNvSpPr txBox="1"/>
+            <p:nvPr/>
+          </p:nvSpPr>
+          <p:spPr>
+            <a:xfrm>
+              <a:off x="7041445" y="12279390"/>
+              <a:ext cx="2706771" cy="954107"/>
+            </a:xfrm>
+            <a:prstGeom prst="rect">
+              <a:avLst/>
+            </a:prstGeom>
+            <a:noFill/>
+          </p:spPr>
+          <p:txBody>
+            <a:bodyPr wrap="square" rtlCol="0">
+              <a:spAutoFit/>
+            </a:bodyPr>
+            <a:lstStyle/>
+            <a:p>
+              <a:r>
+                <a:rPr lang="en-US" sz="2800" dirty="0" smtClean="0">
+                  <a:latin typeface="Apple Casual"/>
+                  <a:cs typeface="Apple Casual"/>
+                </a:rPr>
+                <a:t>Num. playoff series won</a:t>
+              </a:r>
+              <a:endParaRPr lang="en-US" sz="2800" dirty="0">
                 <a:latin typeface="Apple Casual"/>
                 <a:cs typeface="Apple Casual"/>
-              </a:rPr>
-              <a:t>The bigger the dot, the more successful that team was in the playoffs</a:t>
-            </a:r>
-            <a:endParaRPr lang="en-US" sz="2800" dirty="0">
-              <a:latin typeface="Apple Casual"/>
-              <a:cs typeface="Apple Casual"/>
-            </a:endParaRPr>
-          </a:p>
-        </p:txBody>
-      </p:sp>
-      <p:cxnSp>
-        <p:nvCxnSpPr>
-          <p:cNvPr id="31" name="Curved Connector 30"/>
-          <p:cNvCxnSpPr/>
-          <p:nvPr/>
-        </p:nvCxnSpPr>
-        <p:spPr>
-          <a:xfrm rot="10800000">
-            <a:off x="1925599" y="8133108"/>
-            <a:ext cx="3059151" cy="912114"/>
-          </a:xfrm>
-          <a:prstGeom prst="curvedConnector3">
-            <a:avLst>
-              <a:gd name="adj1" fmla="val 50000"/>
-            </a:avLst>
-          </a:prstGeom>
-          <a:ln w="38100" cmpd="sng">
-            <a:solidFill>
-              <a:srgbClr val="000000"/>
-            </a:solidFill>
-            <a:tailEnd type="arrow"/>
-          </a:ln>
-          <a:effectLst>
-            <a:outerShdw blurRad="50800" dist="38100" dir="2700000" algn="tl" rotWithShape="0">
-              <a:srgbClr val="000000">
-                <a:alpha val="43000"/>
-              </a:srgbClr>
-            </a:outerShdw>
-          </a:effectLst>
-        </p:spPr>
-        <p:style>
-          <a:lnRef idx="2">
-            <a:schemeClr val="accent1"/>
-          </a:lnRef>
-          <a:fillRef idx="0">
-            <a:schemeClr val="accent1"/>
-          </a:fillRef>
-          <a:effectRef idx="1">
-            <a:schemeClr val="accent1"/>
-          </a:effectRef>
-          <a:fontRef idx="minor">
-            <a:schemeClr val="tx1"/>
-          </a:fontRef>
-        </p:style>
-      </p:cxnSp>
-      <p:sp>
-        <p:nvSpPr>
-          <p:cNvPr id="33" name="TextBox 32"/>
-          <p:cNvSpPr txBox="1"/>
-          <p:nvPr/>
-        </p:nvSpPr>
-        <p:spPr>
-          <a:xfrm>
-            <a:off x="5069415" y="8613209"/>
-            <a:ext cx="4841431" cy="1384995"/>
-          </a:xfrm>
-          <a:prstGeom prst="rect">
-            <a:avLst/>
-          </a:prstGeom>
-          <a:noFill/>
-        </p:spPr>
-        <p:txBody>
-          <a:bodyPr wrap="square" rtlCol="0">
-            <a:spAutoFit/>
-          </a:bodyPr>
-          <a:lstStyle/>
-          <a:p>
-            <a:r>
-              <a:rPr lang="en-US" sz="2800" dirty="0" smtClean="0">
+              </a:endParaRPr>
+            </a:p>
+          </p:txBody>
+        </p:sp>
+        <p:cxnSp>
+          <p:nvCxnSpPr>
+            <p:cNvPr id="50" name="Curved Connector 49"/>
+            <p:cNvCxnSpPr/>
+            <p:nvPr/>
+          </p:nvCxnSpPr>
+          <p:spPr>
+            <a:xfrm rot="10800000">
+              <a:off x="5354459" y="13273008"/>
+              <a:ext cx="1799874" cy="318120"/>
+            </a:xfrm>
+            <a:prstGeom prst="curvedConnector3">
+              <a:avLst>
+                <a:gd name="adj1" fmla="val 50000"/>
+              </a:avLst>
+            </a:prstGeom>
+            <a:ln w="38100" cmpd="sng">
+              <a:solidFill>
+                <a:srgbClr val="000000"/>
+              </a:solidFill>
+              <a:tailEnd type="arrow"/>
+            </a:ln>
+            <a:effectLst>
+              <a:outerShdw blurRad="50800" dist="38100" dir="2700000" algn="tl" rotWithShape="0">
+                <a:srgbClr val="000000">
+                  <a:alpha val="43000"/>
+                </a:srgbClr>
+              </a:outerShdw>
+            </a:effectLst>
+          </p:spPr>
+          <p:style>
+            <a:lnRef idx="2">
+              <a:schemeClr val="accent1"/>
+            </a:lnRef>
+            <a:fillRef idx="0">
+              <a:schemeClr val="accent1"/>
+            </a:fillRef>
+            <a:effectRef idx="1">
+              <a:schemeClr val="accent1"/>
+            </a:effectRef>
+            <a:fontRef idx="minor">
+              <a:schemeClr val="tx1"/>
+            </a:fontRef>
+          </p:style>
+        </p:cxnSp>
+        <p:sp>
+          <p:nvSpPr>
+            <p:cNvPr id="52" name="TextBox 51"/>
+            <p:cNvSpPr txBox="1"/>
+            <p:nvPr/>
+          </p:nvSpPr>
+          <p:spPr>
+            <a:xfrm>
+              <a:off x="7207956" y="13301296"/>
+              <a:ext cx="2706771" cy="1384995"/>
+            </a:xfrm>
+            <a:prstGeom prst="rect">
+              <a:avLst/>
+            </a:prstGeom>
+            <a:noFill/>
+          </p:spPr>
+          <p:txBody>
+            <a:bodyPr wrap="square" rtlCol="0">
+              <a:spAutoFit/>
+            </a:bodyPr>
+            <a:lstStyle/>
+            <a:p>
+              <a:r>
+                <a:rPr lang="en-US" sz="2800" dirty="0" smtClean="0">
+                  <a:latin typeface="Apple Casual"/>
+                  <a:cs typeface="Apple Casual"/>
+                </a:rPr>
+                <a:t>Most similar team stats to chosen team</a:t>
+              </a:r>
+              <a:endParaRPr lang="en-US" sz="2800" dirty="0">
                 <a:latin typeface="Apple Casual"/>
                 <a:cs typeface="Apple Casual"/>
-              </a:rPr>
-              <a:t>And the closer a dot is to the center, the more similar it is to the chosen team</a:t>
-            </a:r>
-            <a:endParaRPr lang="en-US" sz="2800" dirty="0">
-              <a:latin typeface="Apple Casual"/>
-              <a:cs typeface="Apple Casual"/>
-            </a:endParaRPr>
-          </a:p>
-        </p:txBody>
-      </p:sp>
-      <p:pic>
-        <p:nvPicPr>
-          <p:cNvPr id="35" name="Picture 34" descr="Screen Shot 2014-09-09 at 12.47.13 AM.png"/>
-          <p:cNvPicPr>
-            <a:picLocks noChangeAspect="1"/>
-          </p:cNvPicPr>
-          <p:nvPr/>
-        </p:nvPicPr>
-        <p:blipFill rotWithShape="1">
-          <a:blip r:embed="rId5">
-            <a:extLst>
-              <a:ext uri="{28A0092B-C50C-407E-A947-70E740481C1C}">
-                <a14:useLocalDpi xmlns:a14="http://schemas.microsoft.com/office/drawing/2010/main" val="0"/>
-              </a:ext>
-            </a:extLst>
-          </a:blip>
-          <a:srcRect l="13498" t="17044" b="11237"/>
-          <a:stretch/>
-        </p:blipFill>
-        <p:spPr>
-          <a:xfrm>
-            <a:off x="2959971" y="11125967"/>
-            <a:ext cx="3504934" cy="3396826"/>
-          </a:xfrm>
-          <a:prstGeom prst="rect">
-            <a:avLst/>
-          </a:prstGeom>
-        </p:spPr>
-      </p:pic>
-      <p:cxnSp>
-        <p:nvCxnSpPr>
-          <p:cNvPr id="36" name="Curved Connector 35"/>
-          <p:cNvCxnSpPr/>
-          <p:nvPr/>
-        </p:nvCxnSpPr>
-        <p:spPr>
-          <a:xfrm rot="5400000" flipH="1" flipV="1">
-            <a:off x="2336969" y="9445810"/>
-            <a:ext cx="1171222" cy="962715"/>
-          </a:xfrm>
-          <a:prstGeom prst="curvedConnector3">
-            <a:avLst>
-              <a:gd name="adj1" fmla="val 50000"/>
-            </a:avLst>
-          </a:prstGeom>
-          <a:ln w="38100" cmpd="sng">
-            <a:solidFill>
-              <a:srgbClr val="000000"/>
-            </a:solidFill>
-            <a:tailEnd type="arrow"/>
-          </a:ln>
-          <a:effectLst>
-            <a:outerShdw blurRad="50800" dist="38100" dir="2700000" algn="tl" rotWithShape="0">
-              <a:srgbClr val="000000">
-                <a:alpha val="43000"/>
-              </a:srgbClr>
-            </a:outerShdw>
-          </a:effectLst>
-        </p:spPr>
-        <p:style>
-          <a:lnRef idx="2">
-            <a:schemeClr val="accent1"/>
-          </a:lnRef>
-          <a:fillRef idx="0">
-            <a:schemeClr val="accent1"/>
-          </a:fillRef>
-          <a:effectRef idx="1">
-            <a:schemeClr val="accent1"/>
-          </a:effectRef>
-          <a:fontRef idx="minor">
-            <a:schemeClr val="tx1"/>
-          </a:fontRef>
-        </p:style>
-      </p:cxnSp>
-      <p:sp>
-        <p:nvSpPr>
-          <p:cNvPr id="39" name="TextBox 38"/>
-          <p:cNvSpPr txBox="1"/>
-          <p:nvPr/>
-        </p:nvSpPr>
-        <p:spPr>
-          <a:xfrm>
-            <a:off x="459731" y="10385779"/>
-            <a:ext cx="5148726" cy="954107"/>
-          </a:xfrm>
-          <a:prstGeom prst="rect">
-            <a:avLst/>
-          </a:prstGeom>
-          <a:noFill/>
-        </p:spPr>
-        <p:txBody>
-          <a:bodyPr wrap="square" rtlCol="0">
-            <a:spAutoFit/>
-          </a:bodyPr>
-          <a:lstStyle/>
-          <a:p>
-            <a:r>
-              <a:rPr lang="en-US" sz="2800" dirty="0" smtClean="0">
-                <a:latin typeface="Apple Casual"/>
-                <a:cs typeface="Apple Casual"/>
-              </a:rPr>
-              <a:t>Click on a data point to see more info</a:t>
-            </a:r>
-            <a:endParaRPr lang="en-US" sz="2800" dirty="0">
-              <a:latin typeface="Apple Casual"/>
-              <a:cs typeface="Apple Casual"/>
-            </a:endParaRPr>
-          </a:p>
-        </p:txBody>
-      </p:sp>
-      <p:cxnSp>
-        <p:nvCxnSpPr>
-          <p:cNvPr id="40" name="Curved Connector 39"/>
-          <p:cNvCxnSpPr/>
-          <p:nvPr/>
-        </p:nvCxnSpPr>
-        <p:spPr>
-          <a:xfrm>
-            <a:off x="2201595" y="11168303"/>
-            <a:ext cx="1693072" cy="1320030"/>
-          </a:xfrm>
-          <a:prstGeom prst="curvedConnector3">
-            <a:avLst>
-              <a:gd name="adj1" fmla="val 50000"/>
-            </a:avLst>
-          </a:prstGeom>
-          <a:ln w="38100" cmpd="sng">
-            <a:solidFill>
-              <a:srgbClr val="000000"/>
-            </a:solidFill>
-            <a:tailEnd type="arrow"/>
-          </a:ln>
-          <a:effectLst>
-            <a:outerShdw blurRad="50800" dist="38100" dir="2700000" algn="tl" rotWithShape="0">
-              <a:srgbClr val="000000">
-                <a:alpha val="43000"/>
-              </a:srgbClr>
-            </a:outerShdw>
-          </a:effectLst>
-        </p:spPr>
-        <p:style>
-          <a:lnRef idx="2">
-            <a:schemeClr val="accent1"/>
-          </a:lnRef>
-          <a:fillRef idx="0">
-            <a:schemeClr val="accent1"/>
-          </a:fillRef>
-          <a:effectRef idx="1">
-            <a:schemeClr val="accent1"/>
-          </a:effectRef>
-          <a:fontRef idx="minor">
-            <a:schemeClr val="tx1"/>
-          </a:fontRef>
-        </p:style>
-      </p:cxnSp>
-      <p:cxnSp>
-        <p:nvCxnSpPr>
-          <p:cNvPr id="9" name="Curved Connector 8"/>
-          <p:cNvCxnSpPr/>
-          <p:nvPr/>
-        </p:nvCxnSpPr>
-        <p:spPr>
-          <a:xfrm rot="16200000" flipH="1" flipV="1">
-            <a:off x="6625098" y="10711602"/>
-            <a:ext cx="416943" cy="2450224"/>
-          </a:xfrm>
-          <a:prstGeom prst="curvedConnector2">
-            <a:avLst/>
-          </a:prstGeom>
-          <a:ln w="38100" cmpd="sng">
-            <a:solidFill>
-              <a:srgbClr val="000000"/>
-            </a:solidFill>
-            <a:tailEnd type="arrow"/>
-          </a:ln>
-          <a:effectLst>
-            <a:outerShdw blurRad="50800" dist="38100" dir="2700000" algn="tl" rotWithShape="0">
-              <a:srgbClr val="000000">
-                <a:alpha val="43000"/>
-              </a:srgbClr>
-            </a:outerShdw>
-          </a:effectLst>
-        </p:spPr>
-        <p:style>
-          <a:lnRef idx="2">
-            <a:schemeClr val="accent1"/>
-          </a:lnRef>
-          <a:fillRef idx="0">
-            <a:schemeClr val="accent1"/>
-          </a:fillRef>
-          <a:effectRef idx="1">
-            <a:schemeClr val="accent1"/>
-          </a:effectRef>
-          <a:fontRef idx="minor">
-            <a:schemeClr val="tx1"/>
-          </a:fontRef>
-        </p:style>
-      </p:cxnSp>
-      <p:cxnSp>
-        <p:nvCxnSpPr>
-          <p:cNvPr id="45" name="Curved Connector 44"/>
-          <p:cNvCxnSpPr/>
-          <p:nvPr/>
-        </p:nvCxnSpPr>
-        <p:spPr>
-          <a:xfrm rot="10800000">
-            <a:off x="5549195" y="12438324"/>
-            <a:ext cx="1492250" cy="318120"/>
-          </a:xfrm>
-          <a:prstGeom prst="curvedConnector3">
-            <a:avLst>
-              <a:gd name="adj1" fmla="val 50000"/>
-            </a:avLst>
-          </a:prstGeom>
-          <a:ln w="38100" cmpd="sng">
-            <a:solidFill>
-              <a:srgbClr val="000000"/>
-            </a:solidFill>
-            <a:tailEnd type="arrow"/>
-          </a:ln>
-          <a:effectLst>
-            <a:outerShdw blurRad="50800" dist="38100" dir="2700000" algn="tl" rotWithShape="0">
-              <a:srgbClr val="000000">
-                <a:alpha val="43000"/>
-              </a:srgbClr>
-            </a:outerShdw>
-          </a:effectLst>
-        </p:spPr>
-        <p:style>
-          <a:lnRef idx="2">
-            <a:schemeClr val="accent1"/>
-          </a:lnRef>
-          <a:fillRef idx="0">
-            <a:schemeClr val="accent1"/>
-          </a:fillRef>
-          <a:effectRef idx="1">
-            <a:schemeClr val="accent1"/>
-          </a:effectRef>
-          <a:fontRef idx="minor">
-            <a:schemeClr val="tx1"/>
-          </a:fontRef>
-        </p:style>
-      </p:cxnSp>
-      <p:sp>
-        <p:nvSpPr>
-          <p:cNvPr id="49" name="TextBox 48"/>
-          <p:cNvSpPr txBox="1"/>
-          <p:nvPr/>
-        </p:nvSpPr>
-        <p:spPr>
-          <a:xfrm>
-            <a:off x="7041445" y="12279390"/>
-            <a:ext cx="2706771" cy="954107"/>
-          </a:xfrm>
-          <a:prstGeom prst="rect">
-            <a:avLst/>
-          </a:prstGeom>
-          <a:noFill/>
-        </p:spPr>
-        <p:txBody>
-          <a:bodyPr wrap="square" rtlCol="0">
-            <a:spAutoFit/>
-          </a:bodyPr>
-          <a:lstStyle/>
-          <a:p>
-            <a:r>
-              <a:rPr lang="en-US" sz="2800" dirty="0" smtClean="0">
-                <a:latin typeface="Apple Casual"/>
-                <a:cs typeface="Apple Casual"/>
-              </a:rPr>
-              <a:t>Num. playoff series won</a:t>
-            </a:r>
-            <a:endParaRPr lang="en-US" sz="2800" dirty="0">
-              <a:latin typeface="Apple Casual"/>
-              <a:cs typeface="Apple Casual"/>
-            </a:endParaRPr>
-          </a:p>
-        </p:txBody>
-      </p:sp>
-      <p:cxnSp>
-        <p:nvCxnSpPr>
-          <p:cNvPr id="50" name="Curved Connector 49"/>
-          <p:cNvCxnSpPr/>
-          <p:nvPr/>
-        </p:nvCxnSpPr>
-        <p:spPr>
-          <a:xfrm rot="10800000">
-            <a:off x="5354459" y="13273008"/>
-            <a:ext cx="1799874" cy="318120"/>
-          </a:xfrm>
-          <a:prstGeom prst="curvedConnector3">
-            <a:avLst>
-              <a:gd name="adj1" fmla="val 50000"/>
-            </a:avLst>
-          </a:prstGeom>
-          <a:ln w="38100" cmpd="sng">
-            <a:solidFill>
-              <a:srgbClr val="000000"/>
-            </a:solidFill>
-            <a:tailEnd type="arrow"/>
-          </a:ln>
-          <a:effectLst>
-            <a:outerShdw blurRad="50800" dist="38100" dir="2700000" algn="tl" rotWithShape="0">
-              <a:srgbClr val="000000">
-                <a:alpha val="43000"/>
-              </a:srgbClr>
-            </a:outerShdw>
-          </a:effectLst>
-        </p:spPr>
-        <p:style>
-          <a:lnRef idx="2">
-            <a:schemeClr val="accent1"/>
-          </a:lnRef>
-          <a:fillRef idx="0">
-            <a:schemeClr val="accent1"/>
-          </a:fillRef>
-          <a:effectRef idx="1">
-            <a:schemeClr val="accent1"/>
-          </a:effectRef>
-          <a:fontRef idx="minor">
-            <a:schemeClr val="tx1"/>
-          </a:fontRef>
-        </p:style>
-      </p:cxnSp>
-      <p:sp>
-        <p:nvSpPr>
-          <p:cNvPr id="52" name="TextBox 51"/>
-          <p:cNvSpPr txBox="1"/>
-          <p:nvPr/>
-        </p:nvSpPr>
-        <p:spPr>
-          <a:xfrm>
-            <a:off x="7207956" y="13301296"/>
-            <a:ext cx="2706771" cy="1384995"/>
-          </a:xfrm>
-          <a:prstGeom prst="rect">
-            <a:avLst/>
-          </a:prstGeom>
-          <a:noFill/>
-        </p:spPr>
-        <p:txBody>
-          <a:bodyPr wrap="square" rtlCol="0">
-            <a:spAutoFit/>
-          </a:bodyPr>
-          <a:lstStyle/>
-          <a:p>
-            <a:r>
-              <a:rPr lang="en-US" sz="2800" dirty="0" smtClean="0">
-                <a:latin typeface="Apple Casual"/>
-                <a:cs typeface="Apple Casual"/>
-              </a:rPr>
-              <a:t>Most similar team stats to chosen team</a:t>
-            </a:r>
-            <a:endParaRPr lang="en-US" sz="2800" dirty="0">
-              <a:latin typeface="Apple Casual"/>
-              <a:cs typeface="Apple Casual"/>
-            </a:endParaRPr>
-          </a:p>
-        </p:txBody>
-      </p:sp>
+              </a:endParaRPr>
+            </a:p>
+          </p:txBody>
+        </p:sp>
+      </p:grpSp>
     </p:spTree>
     <p:extLst>
       <p:ext uri="{BB962C8B-B14F-4D97-AF65-F5344CB8AC3E}">

</xml_diff>